<commit_message>
run example qmd too
</commit_message>
<xml_diff>
--- a/introduction/hello.pptx
+++ b/introduction/hello.pptx
@@ -3348,8 +3348,8 @@
         </p:blipFill>
         <p:spPr bwMode="auto">
           <a:xfrm>
-            <a:off x="3860800" y="203200"/>
-            <a:ext cx="4508500" cy="4381500"/>
+            <a:off x="3886200" y="203200"/>
+            <a:ext cx="4470400" cy="4381500"/>
           </a:xfrm>
           <a:prstGeom prst="rect">
             <a:avLst/>

</xml_diff>